<commit_message>
pt1 lecture2 vtable slides minor fixes
</commit_message>
<xml_diff>
--- a/pt1/lectures/lecture2/lecture2.pptx
+++ b/pt1/lectures/lecture2/lecture2.pptx
@@ -4,6 +4,9 @@
   <p:sldMasterIdLst>
     <p:sldMasterId id="2147483648" r:id="rId1"/>
   </p:sldMasterIdLst>
+  <p:notesMasterIdLst>
+    <p:notesMasterId r:id="rId20"/>
+  </p:notesMasterIdLst>
   <p:sldIdLst>
     <p:sldId id="256" r:id="rId2"/>
     <p:sldId id="257" r:id="rId3"/>
@@ -138,6 +141,440 @@
     </p:ext>
   </p:extLst>
 </p:presentation>
+</file>
+
+<file path=ppt/notesMasters/notesMaster1.xml><?xml version="1.0" encoding="utf-8"?>
+<p:notesMaster xmlns:a="http://schemas.openxmlformats.org/drawingml/2006/main" xmlns:r="http://schemas.openxmlformats.org/officeDocument/2006/relationships" xmlns:p="http://schemas.openxmlformats.org/presentationml/2006/main">
+  <p:cSld>
+    <p:bg>
+      <p:bgRef idx="1001">
+        <a:schemeClr val="bg1"/>
+      </p:bgRef>
+    </p:bg>
+    <p:spTree>
+      <p:nvGrpSpPr>
+        <p:cNvPr id="1" name=""/>
+        <p:cNvGrpSpPr/>
+        <p:nvPr/>
+      </p:nvGrpSpPr>
+      <p:grpSpPr>
+        <a:xfrm>
+          <a:off x="0" y="0"/>
+          <a:ext cx="0" cy="0"/>
+          <a:chOff x="0" y="0"/>
+          <a:chExt cx="0" cy="0"/>
+        </a:xfrm>
+      </p:grpSpPr>
+      <p:sp>
+        <p:nvSpPr>
+          <p:cNvPr id="2" name="Верхний колонтитул 1"/>
+          <p:cNvSpPr>
+            <a:spLocks noGrp="1"/>
+          </p:cNvSpPr>
+          <p:nvPr>
+            <p:ph type="hdr" sz="quarter"/>
+          </p:nvPr>
+        </p:nvSpPr>
+        <p:spPr>
+          <a:xfrm>
+            <a:off x="0" y="0"/>
+            <a:ext cx="5283200" cy="344488"/>
+          </a:xfrm>
+          <a:prstGeom prst="rect">
+            <a:avLst/>
+          </a:prstGeom>
+        </p:spPr>
+        <p:txBody>
+          <a:bodyPr vert="horz" lIns="91440" tIns="45720" rIns="91440" bIns="45720" rtlCol="0"/>
+          <a:lstStyle>
+            <a:lvl1pPr algn="l">
+              <a:defRPr sz="1200"/>
+            </a:lvl1pPr>
+          </a:lstStyle>
+          <a:p>
+            <a:endParaRPr lang="en-US"/>
+          </a:p>
+        </p:txBody>
+      </p:sp>
+      <p:sp>
+        <p:nvSpPr>
+          <p:cNvPr id="3" name="Дата 2"/>
+          <p:cNvSpPr>
+            <a:spLocks noGrp="1"/>
+          </p:cNvSpPr>
+          <p:nvPr>
+            <p:ph type="dt" idx="1"/>
+          </p:nvPr>
+        </p:nvSpPr>
+        <p:spPr>
+          <a:xfrm>
+            <a:off x="6905625" y="0"/>
+            <a:ext cx="5283200" cy="344488"/>
+          </a:xfrm>
+          <a:prstGeom prst="rect">
+            <a:avLst/>
+          </a:prstGeom>
+        </p:spPr>
+        <p:txBody>
+          <a:bodyPr vert="horz" lIns="91440" tIns="45720" rIns="91440" bIns="45720" rtlCol="0"/>
+          <a:lstStyle>
+            <a:lvl1pPr algn="r">
+              <a:defRPr sz="1200"/>
+            </a:lvl1pPr>
+          </a:lstStyle>
+          <a:p>
+            <a:fld id="{837F26EA-5E7F-475A-A618-86B61A4101A6}" type="datetimeFigureOut">
+              <a:rPr lang="en-US" smtClean="0"/>
+              <a:t>8/16/2022</a:t>
+            </a:fld>
+            <a:endParaRPr lang="en-US"/>
+          </a:p>
+        </p:txBody>
+      </p:sp>
+      <p:sp>
+        <p:nvSpPr>
+          <p:cNvPr id="4" name="Образ слайда 3"/>
+          <p:cNvSpPr>
+            <a:spLocks noGrp="1" noRot="1" noChangeAspect="1"/>
+          </p:cNvSpPr>
+          <p:nvPr>
+            <p:ph type="sldImg" idx="2"/>
+          </p:nvPr>
+        </p:nvSpPr>
+        <p:spPr>
+          <a:xfrm>
+            <a:off x="4038600" y="857250"/>
+            <a:ext cx="4114800" cy="2314575"/>
+          </a:xfrm>
+          <a:prstGeom prst="rect">
+            <a:avLst/>
+          </a:prstGeom>
+          <a:noFill/>
+          <a:ln w="12700">
+            <a:solidFill>
+              <a:prstClr val="black"/>
+            </a:solidFill>
+          </a:ln>
+        </p:spPr>
+        <p:txBody>
+          <a:bodyPr vert="horz" lIns="91440" tIns="45720" rIns="91440" bIns="45720" rtlCol="0" anchor="ctr"/>
+          <a:lstStyle/>
+          <a:p>
+            <a:endParaRPr lang="en-US"/>
+          </a:p>
+        </p:txBody>
+      </p:sp>
+      <p:sp>
+        <p:nvSpPr>
+          <p:cNvPr id="5" name="Заметки 4"/>
+          <p:cNvSpPr>
+            <a:spLocks noGrp="1"/>
+          </p:cNvSpPr>
+          <p:nvPr>
+            <p:ph type="body" sz="quarter" idx="3"/>
+          </p:nvPr>
+        </p:nvSpPr>
+        <p:spPr>
+          <a:xfrm>
+            <a:off x="1219200" y="3300413"/>
+            <a:ext cx="9753600" cy="2700337"/>
+          </a:xfrm>
+          <a:prstGeom prst="rect">
+            <a:avLst/>
+          </a:prstGeom>
+        </p:spPr>
+        <p:txBody>
+          <a:bodyPr vert="horz" lIns="91440" tIns="45720" rIns="91440" bIns="45720" rtlCol="0"/>
+          <a:lstStyle/>
+          <a:p>
+            <a:pPr lvl="0"/>
+            <a:r>
+              <a:rPr lang="ru-RU" smtClean="0"/>
+              <a:t>Образец текста</a:t>
+            </a:r>
+          </a:p>
+          <a:p>
+            <a:pPr lvl="1"/>
+            <a:r>
+              <a:rPr lang="ru-RU" smtClean="0"/>
+              <a:t>Второй уровень</a:t>
+            </a:r>
+          </a:p>
+          <a:p>
+            <a:pPr lvl="2"/>
+            <a:r>
+              <a:rPr lang="ru-RU" smtClean="0"/>
+              <a:t>Третий уровень</a:t>
+            </a:r>
+          </a:p>
+          <a:p>
+            <a:pPr lvl="3"/>
+            <a:r>
+              <a:rPr lang="ru-RU" smtClean="0"/>
+              <a:t>Четвертый уровень</a:t>
+            </a:r>
+          </a:p>
+          <a:p>
+            <a:pPr lvl="4"/>
+            <a:r>
+              <a:rPr lang="ru-RU" smtClean="0"/>
+              <a:t>Пятый уровень</a:t>
+            </a:r>
+            <a:endParaRPr lang="en-US"/>
+          </a:p>
+        </p:txBody>
+      </p:sp>
+      <p:sp>
+        <p:nvSpPr>
+          <p:cNvPr id="6" name="Нижний колонтитул 5"/>
+          <p:cNvSpPr>
+            <a:spLocks noGrp="1"/>
+          </p:cNvSpPr>
+          <p:nvPr>
+            <p:ph type="ftr" sz="quarter" idx="4"/>
+          </p:nvPr>
+        </p:nvSpPr>
+        <p:spPr>
+          <a:xfrm>
+            <a:off x="0" y="6513513"/>
+            <a:ext cx="5283200" cy="344487"/>
+          </a:xfrm>
+          <a:prstGeom prst="rect">
+            <a:avLst/>
+          </a:prstGeom>
+        </p:spPr>
+        <p:txBody>
+          <a:bodyPr vert="horz" lIns="91440" tIns="45720" rIns="91440" bIns="45720" rtlCol="0" anchor="b"/>
+          <a:lstStyle>
+            <a:lvl1pPr algn="l">
+              <a:defRPr sz="1200"/>
+            </a:lvl1pPr>
+          </a:lstStyle>
+          <a:p>
+            <a:endParaRPr lang="en-US"/>
+          </a:p>
+        </p:txBody>
+      </p:sp>
+      <p:sp>
+        <p:nvSpPr>
+          <p:cNvPr id="7" name="Номер слайда 6"/>
+          <p:cNvSpPr>
+            <a:spLocks noGrp="1"/>
+          </p:cNvSpPr>
+          <p:nvPr>
+            <p:ph type="sldNum" sz="quarter" idx="5"/>
+          </p:nvPr>
+        </p:nvSpPr>
+        <p:spPr>
+          <a:xfrm>
+            <a:off x="6905625" y="6513513"/>
+            <a:ext cx="5283200" cy="344487"/>
+          </a:xfrm>
+          <a:prstGeom prst="rect">
+            <a:avLst/>
+          </a:prstGeom>
+        </p:spPr>
+        <p:txBody>
+          <a:bodyPr vert="horz" lIns="91440" tIns="45720" rIns="91440" bIns="45720" rtlCol="0" anchor="b"/>
+          <a:lstStyle>
+            <a:lvl1pPr algn="r">
+              <a:defRPr sz="1200"/>
+            </a:lvl1pPr>
+          </a:lstStyle>
+          <a:p>
+            <a:fld id="{B1891ED8-C797-425D-9C4F-8D2CCD58B803}" type="slidenum">
+              <a:rPr lang="en-US" smtClean="0"/>
+              <a:t>‹#›</a:t>
+            </a:fld>
+            <a:endParaRPr lang="en-US"/>
+          </a:p>
+        </p:txBody>
+      </p:sp>
+    </p:spTree>
+    <p:extLst>
+      <p:ext uri="{BB962C8B-B14F-4D97-AF65-F5344CB8AC3E}">
+        <p14:creationId xmlns:p14="http://schemas.microsoft.com/office/powerpoint/2010/main" val="549037762"/>
+      </p:ext>
+    </p:extLst>
+  </p:cSld>
+  <p:clrMap bg1="lt1" tx1="dk1" bg2="lt2" tx2="dk2" accent1="accent1" accent2="accent2" accent3="accent3" accent4="accent4" accent5="accent5" accent6="accent6" hlink="hlink" folHlink="folHlink"/>
+  <p:notesStyle>
+    <a:lvl1pPr marL="0" algn="l" defTabSz="914400" rtl="0" eaLnBrk="1" latinLnBrk="0" hangingPunct="1">
+      <a:defRPr sz="1200" kern="1200">
+        <a:solidFill>
+          <a:schemeClr val="tx1"/>
+        </a:solidFill>
+        <a:latin typeface="+mn-lt"/>
+        <a:ea typeface="+mn-ea"/>
+        <a:cs typeface="+mn-cs"/>
+      </a:defRPr>
+    </a:lvl1pPr>
+    <a:lvl2pPr marL="457200" algn="l" defTabSz="914400" rtl="0" eaLnBrk="1" latinLnBrk="0" hangingPunct="1">
+      <a:defRPr sz="1200" kern="1200">
+        <a:solidFill>
+          <a:schemeClr val="tx1"/>
+        </a:solidFill>
+        <a:latin typeface="+mn-lt"/>
+        <a:ea typeface="+mn-ea"/>
+        <a:cs typeface="+mn-cs"/>
+      </a:defRPr>
+    </a:lvl2pPr>
+    <a:lvl3pPr marL="914400" algn="l" defTabSz="914400" rtl="0" eaLnBrk="1" latinLnBrk="0" hangingPunct="1">
+      <a:defRPr sz="1200" kern="1200">
+        <a:solidFill>
+          <a:schemeClr val="tx1"/>
+        </a:solidFill>
+        <a:latin typeface="+mn-lt"/>
+        <a:ea typeface="+mn-ea"/>
+        <a:cs typeface="+mn-cs"/>
+      </a:defRPr>
+    </a:lvl3pPr>
+    <a:lvl4pPr marL="1371600" algn="l" defTabSz="914400" rtl="0" eaLnBrk="1" latinLnBrk="0" hangingPunct="1">
+      <a:defRPr sz="1200" kern="1200">
+        <a:solidFill>
+          <a:schemeClr val="tx1"/>
+        </a:solidFill>
+        <a:latin typeface="+mn-lt"/>
+        <a:ea typeface="+mn-ea"/>
+        <a:cs typeface="+mn-cs"/>
+      </a:defRPr>
+    </a:lvl4pPr>
+    <a:lvl5pPr marL="1828800" algn="l" defTabSz="914400" rtl="0" eaLnBrk="1" latinLnBrk="0" hangingPunct="1">
+      <a:defRPr sz="1200" kern="1200">
+        <a:solidFill>
+          <a:schemeClr val="tx1"/>
+        </a:solidFill>
+        <a:latin typeface="+mn-lt"/>
+        <a:ea typeface="+mn-ea"/>
+        <a:cs typeface="+mn-cs"/>
+      </a:defRPr>
+    </a:lvl5pPr>
+    <a:lvl6pPr marL="2286000" algn="l" defTabSz="914400" rtl="0" eaLnBrk="1" latinLnBrk="0" hangingPunct="1">
+      <a:defRPr sz="1200" kern="1200">
+        <a:solidFill>
+          <a:schemeClr val="tx1"/>
+        </a:solidFill>
+        <a:latin typeface="+mn-lt"/>
+        <a:ea typeface="+mn-ea"/>
+        <a:cs typeface="+mn-cs"/>
+      </a:defRPr>
+    </a:lvl6pPr>
+    <a:lvl7pPr marL="2743200" algn="l" defTabSz="914400" rtl="0" eaLnBrk="1" latinLnBrk="0" hangingPunct="1">
+      <a:defRPr sz="1200" kern="1200">
+        <a:solidFill>
+          <a:schemeClr val="tx1"/>
+        </a:solidFill>
+        <a:latin typeface="+mn-lt"/>
+        <a:ea typeface="+mn-ea"/>
+        <a:cs typeface="+mn-cs"/>
+      </a:defRPr>
+    </a:lvl7pPr>
+    <a:lvl8pPr marL="3200400" algn="l" defTabSz="914400" rtl="0" eaLnBrk="1" latinLnBrk="0" hangingPunct="1">
+      <a:defRPr sz="1200" kern="1200">
+        <a:solidFill>
+          <a:schemeClr val="tx1"/>
+        </a:solidFill>
+        <a:latin typeface="+mn-lt"/>
+        <a:ea typeface="+mn-ea"/>
+        <a:cs typeface="+mn-cs"/>
+      </a:defRPr>
+    </a:lvl8pPr>
+    <a:lvl9pPr marL="3657600" algn="l" defTabSz="914400" rtl="0" eaLnBrk="1" latinLnBrk="0" hangingPunct="1">
+      <a:defRPr sz="1200" kern="1200">
+        <a:solidFill>
+          <a:schemeClr val="tx1"/>
+        </a:solidFill>
+        <a:latin typeface="+mn-lt"/>
+        <a:ea typeface="+mn-ea"/>
+        <a:cs typeface="+mn-cs"/>
+      </a:defRPr>
+    </a:lvl9pPr>
+  </p:notesStyle>
+</p:notesMaster>
+</file>
+
+<file path=ppt/notesSlides/notesSlide1.xml><?xml version="1.0" encoding="utf-8"?>
+<p:notes xmlns:a="http://schemas.openxmlformats.org/drawingml/2006/main" xmlns:r="http://schemas.openxmlformats.org/officeDocument/2006/relationships" xmlns:p="http://schemas.openxmlformats.org/presentationml/2006/main">
+  <p:cSld>
+    <p:spTree>
+      <p:nvGrpSpPr>
+        <p:cNvPr id="1" name=""/>
+        <p:cNvGrpSpPr/>
+        <p:nvPr/>
+      </p:nvGrpSpPr>
+      <p:grpSpPr>
+        <a:xfrm>
+          <a:off x="0" y="0"/>
+          <a:ext cx="0" cy="0"/>
+          <a:chOff x="0" y="0"/>
+          <a:chExt cx="0" cy="0"/>
+        </a:xfrm>
+      </p:grpSpPr>
+      <p:sp>
+        <p:nvSpPr>
+          <p:cNvPr id="2" name="Образ слайда 1"/>
+          <p:cNvSpPr>
+            <a:spLocks noGrp="1" noRot="1" noChangeAspect="1"/>
+          </p:cNvSpPr>
+          <p:nvPr>
+            <p:ph type="sldImg"/>
+          </p:nvPr>
+        </p:nvSpPr>
+        <p:spPr/>
+      </p:sp>
+      <p:sp>
+        <p:nvSpPr>
+          <p:cNvPr id="3" name="Заметки 2"/>
+          <p:cNvSpPr>
+            <a:spLocks noGrp="1"/>
+          </p:cNvSpPr>
+          <p:nvPr>
+            <p:ph type="body" idx="1"/>
+          </p:nvPr>
+        </p:nvSpPr>
+        <p:spPr/>
+        <p:txBody>
+          <a:bodyPr/>
+          <a:lstStyle/>
+          <a:p>
+            <a:endParaRPr lang="en-US" dirty="0"/>
+          </a:p>
+        </p:txBody>
+      </p:sp>
+      <p:sp>
+        <p:nvSpPr>
+          <p:cNvPr id="4" name="Номер слайда 3"/>
+          <p:cNvSpPr>
+            <a:spLocks noGrp="1"/>
+          </p:cNvSpPr>
+          <p:nvPr>
+            <p:ph type="sldNum" sz="quarter" idx="10"/>
+          </p:nvPr>
+        </p:nvSpPr>
+        <p:spPr/>
+        <p:txBody>
+          <a:bodyPr/>
+          <a:lstStyle/>
+          <a:p>
+            <a:fld id="{B1891ED8-C797-425D-9C4F-8D2CCD58B803}" type="slidenum">
+              <a:rPr lang="en-US" smtClean="0"/>
+              <a:t>13</a:t>
+            </a:fld>
+            <a:endParaRPr lang="en-US"/>
+          </a:p>
+        </p:txBody>
+      </p:sp>
+    </p:spTree>
+    <p:extLst>
+      <p:ext uri="{BB962C8B-B14F-4D97-AF65-F5344CB8AC3E}">
+        <p14:creationId xmlns:p14="http://schemas.microsoft.com/office/powerpoint/2010/main" val="427603436"/>
+      </p:ext>
+    </p:extLst>
+  </p:cSld>
+  <p:clrMapOvr>
+    <a:masterClrMapping/>
+  </p:clrMapOvr>
+</p:notes>
 </file>
 
 <file path=ppt/slideLayouts/slideLayout1.xml><?xml version="1.0" encoding="utf-8"?>
@@ -875,7 +1312,7 @@
             </a:pPr>
             <a:fld id="{B3B7C885-B81A-4DB8-BD04-363F10E73211}" type="datetimeFigureOut">
               <a:rPr lang="en-US"/>
-              <a:t>4/4/2022</a:t>
+              <a:t>8/16/2022</a:t>
             </a:fld>
             <a:endParaRPr lang="en-US"/>
           </a:p>
@@ -1136,7 +1573,7 @@
             </a:pPr>
             <a:fld id="{B3B7C885-B81A-4DB8-BD04-363F10E73211}" type="datetimeFigureOut">
               <a:rPr lang="en-US"/>
-              <a:t>4/4/2022</a:t>
+              <a:t>8/16/2022</a:t>
             </a:fld>
             <a:endParaRPr lang="en-US"/>
           </a:p>
@@ -1463,7 +1900,7 @@
             </a:pPr>
             <a:fld id="{B3B7C885-B81A-4DB8-BD04-363F10E73211}" type="datetimeFigureOut">
               <a:rPr lang="en-US"/>
-              <a:t>4/4/2022</a:t>
+              <a:t>8/16/2022</a:t>
             </a:fld>
             <a:endParaRPr lang="en-US"/>
           </a:p>
@@ -1818,7 +2255,7 @@
             </a:pPr>
             <a:fld id="{B3B7C885-B81A-4DB8-BD04-363F10E73211}" type="datetimeFigureOut">
               <a:rPr lang="en-US"/>
-              <a:t>4/4/2022</a:t>
+              <a:t>8/16/2022</a:t>
             </a:fld>
             <a:endParaRPr lang="en-US"/>
           </a:p>
@@ -2145,7 +2582,7 @@
             </a:pPr>
             <a:fld id="{B3B7C885-B81A-4DB8-BD04-363F10E73211}" type="datetimeFigureOut">
               <a:rPr lang="en-US"/>
-              <a:t>4/4/2022</a:t>
+              <a:t>8/16/2022</a:t>
             </a:fld>
             <a:endParaRPr lang="en-US"/>
           </a:p>
@@ -2555,7 +2992,7 @@
             </a:pPr>
             <a:fld id="{B3B7C885-B81A-4DB8-BD04-363F10E73211}" type="datetimeFigureOut">
               <a:rPr lang="en-US"/>
-              <a:t>4/4/2022</a:t>
+              <a:t>8/16/2022</a:t>
             </a:fld>
             <a:endParaRPr lang="en-US"/>
           </a:p>
@@ -2746,7 +3183,7 @@
             </a:pPr>
             <a:fld id="{B3B7C885-B81A-4DB8-BD04-363F10E73211}" type="datetimeFigureOut">
               <a:rPr lang="en-US"/>
-              <a:t>4/4/2022</a:t>
+              <a:t>8/16/2022</a:t>
             </a:fld>
             <a:endParaRPr lang="en-US"/>
           </a:p>
@@ -2947,7 +3384,7 @@
             </a:pPr>
             <a:fld id="{B3B7C885-B81A-4DB8-BD04-363F10E73211}" type="datetimeFigureOut">
               <a:rPr lang="en-US"/>
-              <a:t>4/4/2022</a:t>
+              <a:t>8/16/2022</a:t>
             </a:fld>
             <a:endParaRPr lang="en-US"/>
           </a:p>
@@ -3144,7 +3581,7 @@
             </a:pPr>
             <a:fld id="{B3B7C885-B81A-4DB8-BD04-363F10E73211}" type="datetimeFigureOut">
               <a:rPr lang="en-US"/>
-              <a:t>4/4/2022</a:t>
+              <a:t>8/16/2022</a:t>
             </a:fld>
             <a:endParaRPr lang="en-US"/>
           </a:p>
@@ -3401,7 +3838,7 @@
             </a:pPr>
             <a:fld id="{B3B7C885-B81A-4DB8-BD04-363F10E73211}" type="datetimeFigureOut">
               <a:rPr lang="en-US"/>
-              <a:t>4/4/2022</a:t>
+              <a:t>8/16/2022</a:t>
             </a:fld>
             <a:endParaRPr lang="en-US"/>
           </a:p>
@@ -3668,7 +4105,7 @@
             </a:pPr>
             <a:fld id="{B3B7C885-B81A-4DB8-BD04-363F10E73211}" type="datetimeFigureOut">
               <a:rPr lang="en-US"/>
-              <a:t>4/4/2022</a:t>
+              <a:t>8/16/2022</a:t>
             </a:fld>
             <a:endParaRPr lang="en-US"/>
           </a:p>
@@ -4083,7 +4520,7 @@
             </a:pPr>
             <a:fld id="{B3B7C885-B81A-4DB8-BD04-363F10E73211}" type="datetimeFigureOut">
               <a:rPr lang="en-US"/>
-              <a:t>4/4/2022</a:t>
+              <a:t>8/16/2022</a:t>
             </a:fld>
             <a:endParaRPr lang="en-US"/>
           </a:p>
@@ -4213,7 +4650,7 @@
             </a:pPr>
             <a:fld id="{B3B7C885-B81A-4DB8-BD04-363F10E73211}" type="datetimeFigureOut">
               <a:rPr lang="en-US"/>
-              <a:t>4/4/2022</a:t>
+              <a:t>8/16/2022</a:t>
             </a:fld>
             <a:endParaRPr lang="en-US"/>
           </a:p>
@@ -4312,7 +4749,7 @@
             </a:pPr>
             <a:fld id="{B3B7C885-B81A-4DB8-BD04-363F10E73211}" type="datetimeFigureOut">
               <a:rPr lang="en-US"/>
-              <a:t>4/4/2022</a:t>
+              <a:t>8/16/2022</a:t>
             </a:fld>
             <a:endParaRPr lang="en-US"/>
           </a:p>
@@ -4591,7 +5028,7 @@
             </a:pPr>
             <a:fld id="{B3B7C885-B81A-4DB8-BD04-363F10E73211}" type="datetimeFigureOut">
               <a:rPr lang="en-US"/>
-              <a:t>4/4/2022</a:t>
+              <a:t>8/16/2022</a:t>
             </a:fld>
             <a:endParaRPr lang="en-US"/>
           </a:p>
@@ -4867,7 +5304,7 @@
             </a:pPr>
             <a:fld id="{B3B7C885-B81A-4DB8-BD04-363F10E73211}" type="datetimeFigureOut">
               <a:rPr lang="en-US"/>
-              <a:t>4/4/2022</a:t>
+              <a:t>8/16/2022</a:t>
             </a:fld>
             <a:endParaRPr lang="en-US"/>
           </a:p>
@@ -5635,7 +6072,7 @@
             </a:pPr>
             <a:fld id="{B3B7C885-B81A-4DB8-BD04-363F10E73211}" type="datetimeFigureOut">
               <a:rPr lang="en-US"/>
-              <a:t>4/4/2022</a:t>
+              <a:t>8/16/2022</a:t>
             </a:fld>
             <a:endParaRPr lang="en-US"/>
           </a:p>
@@ -7629,8 +8066,8 @@
         </p:nvSpPr>
         <p:spPr bwMode="auto">
           <a:xfrm>
-            <a:off x="8516172" y="1924438"/>
-            <a:ext cx="3265922" cy="3145315"/>
+            <a:off x="8536397" y="2708920"/>
+            <a:ext cx="3265922" cy="3664802"/>
           </a:xfrm>
           <a:prstGeom prst="rect">
             <a:avLst/>
@@ -7653,8 +8090,72 @@
               <a:defRPr/>
             </a:pPr>
             <a:r>
-              <a:rPr/>
-              <a:t>Каждый класс имеет свою таблицу виртуальных методов (vtable)</a:t>
+              <a:rPr dirty="0" err="1"/>
+              <a:t>Каждый</a:t>
+            </a:r>
+            <a:r>
+              <a:rPr dirty="0"/>
+              <a:t> </a:t>
+            </a:r>
+            <a:r>
+              <a:rPr dirty="0" err="1" smtClean="0"/>
+              <a:t>класс</a:t>
+            </a:r>
+            <a:r>
+              <a:rPr lang="ru-RU" dirty="0" smtClean="0"/>
+              <a:t>, имеющий виртуальные методы,</a:t>
+            </a:r>
+            <a:r>
+              <a:rPr lang="ru-RU" dirty="0" smtClean="0"/>
+              <a:t> </a:t>
+            </a:r>
+            <a:r>
+              <a:rPr dirty="0" err="1" smtClean="0"/>
+              <a:t>имеет</a:t>
+            </a:r>
+            <a:r>
+              <a:rPr dirty="0" smtClean="0"/>
+              <a:t> </a:t>
+            </a:r>
+            <a:r>
+              <a:rPr dirty="0" err="1"/>
+              <a:t>свою</a:t>
+            </a:r>
+            <a:r>
+              <a:rPr dirty="0"/>
+              <a:t> </a:t>
+            </a:r>
+            <a:r>
+              <a:rPr dirty="0" err="1"/>
+              <a:t>таблицу</a:t>
+            </a:r>
+            <a:r>
+              <a:rPr dirty="0"/>
+              <a:t> </a:t>
+            </a:r>
+            <a:r>
+              <a:rPr dirty="0" err="1"/>
+              <a:t>виртуальных</a:t>
+            </a:r>
+            <a:r>
+              <a:rPr dirty="0"/>
+              <a:t> </a:t>
+            </a:r>
+            <a:r>
+              <a:rPr dirty="0" err="1"/>
+              <a:t>методов</a:t>
+            </a:r>
+            <a:r>
+              <a:rPr dirty="0"/>
+              <a:t> (</a:t>
+            </a:r>
+            <a:r>
+              <a:rPr dirty="0" err="1"/>
+              <a:t>vtable</a:t>
+            </a:r>
+            <a:r>
+              <a:rPr dirty="0"/>
+              <a:t>)</a:t>
             </a:r>
           </a:p>
           <a:p>
@@ -7668,9 +8169,106 @@
               <a:defRPr/>
             </a:pPr>
             <a:r>
-              <a:rPr/>
-              <a:t>Vtable общая для всех объектов одного класса, т.е. дейсвует как статическая переменная-член данных</a:t>
-            </a:r>
+              <a:rPr dirty="0" err="1"/>
+              <a:t>Vtable</a:t>
+            </a:r>
+            <a:r>
+              <a:rPr dirty="0"/>
+              <a:t> </a:t>
+            </a:r>
+            <a:r>
+              <a:rPr dirty="0" err="1"/>
+              <a:t>общая</a:t>
+            </a:r>
+            <a:r>
+              <a:rPr dirty="0"/>
+              <a:t> </a:t>
+            </a:r>
+            <a:r>
+              <a:rPr dirty="0" err="1"/>
+              <a:t>для</a:t>
+            </a:r>
+            <a:r>
+              <a:rPr dirty="0"/>
+              <a:t> </a:t>
+            </a:r>
+            <a:r>
+              <a:rPr dirty="0" err="1"/>
+              <a:t>всех</a:t>
+            </a:r>
+            <a:r>
+              <a:rPr dirty="0"/>
+              <a:t> </a:t>
+            </a:r>
+            <a:r>
+              <a:rPr dirty="0" err="1"/>
+              <a:t>объектов</a:t>
+            </a:r>
+            <a:r>
+              <a:rPr dirty="0"/>
+              <a:t> </a:t>
+            </a:r>
+            <a:r>
+              <a:rPr dirty="0" err="1"/>
+              <a:t>одного</a:t>
+            </a:r>
+            <a:r>
+              <a:rPr dirty="0"/>
+              <a:t> </a:t>
+            </a:r>
+            <a:r>
+              <a:rPr dirty="0" err="1"/>
+              <a:t>класса</a:t>
+            </a:r>
+            <a:r>
+              <a:rPr dirty="0"/>
+              <a:t>, </a:t>
+            </a:r>
+            <a:r>
+              <a:rPr dirty="0" err="1"/>
+              <a:t>т.е</a:t>
+            </a:r>
+            <a:r>
+              <a:rPr dirty="0"/>
+              <a:t>. </a:t>
+            </a:r>
+            <a:r>
+              <a:rPr dirty="0" err="1"/>
+              <a:t>дейсвует</a:t>
+            </a:r>
+            <a:r>
+              <a:rPr dirty="0"/>
+              <a:t> </a:t>
+            </a:r>
+            <a:r>
+              <a:rPr dirty="0" err="1"/>
+              <a:t>как</a:t>
+            </a:r>
+            <a:r>
+              <a:rPr dirty="0"/>
+              <a:t> </a:t>
+            </a:r>
+            <a:r>
+              <a:rPr dirty="0" err="1"/>
+              <a:t>статическая</a:t>
+            </a:r>
+            <a:r>
+              <a:rPr dirty="0"/>
+              <a:t> </a:t>
+            </a:r>
+            <a:r>
+              <a:rPr dirty="0" err="1"/>
+              <a:t>переменная-член</a:t>
+            </a:r>
+            <a:r>
+              <a:rPr dirty="0"/>
+              <a:t> </a:t>
+            </a:r>
+            <a:r>
+              <a:rPr dirty="0" err="1"/>
+              <a:t>данных</a:t>
+            </a:r>
+            <a:endParaRPr dirty="0"/>
           </a:p>
           <a:p>
             <a:pPr>
@@ -7682,7 +8280,7 @@
               <a:buChar char="Ø"/>
               <a:defRPr/>
             </a:pPr>
-            <a:endParaRPr/>
+            <a:endParaRPr dirty="0"/>
           </a:p>
         </p:txBody>
       </p:sp>
@@ -7739,12 +8337,12 @@
           <p:nvPr/>
         </p:nvPicPr>
         <p:blipFill>
-          <a:blip r:embed="rId2"/>
+          <a:blip r:embed="rId3"/>
           <a:stretch/>
         </p:blipFill>
         <p:spPr bwMode="auto">
           <a:xfrm>
-            <a:off x="743256" y="1730050"/>
+            <a:off x="732673" y="2667363"/>
             <a:ext cx="7772917" cy="3747916"/>
           </a:xfrm>
           <a:prstGeom prst="rect">
@@ -7752,289 +8350,6 @@
           </a:prstGeom>
         </p:spPr>
       </p:pic>
-      <p:sp>
-        <p:nvSpPr>
-          <p:cNvPr id="249792234" name="Content Placeholder 2"/>
-          <p:cNvSpPr>
-            <a:spLocks noGrp="1"/>
-          </p:cNvSpPr>
-          <p:nvPr/>
-        </p:nvSpPr>
-        <p:spPr bwMode="auto">
-          <a:xfrm>
-            <a:off x="536555" y="5400213"/>
-            <a:ext cx="11245539" cy="1286724"/>
-          </a:xfrm>
-          <a:prstGeom prst="rect">
-            <a:avLst/>
-          </a:prstGeom>
-          <a:solidFill>
-            <a:schemeClr val="bg1"/>
-          </a:solidFill>
-        </p:spPr>
-        <p:txBody>
-          <a:bodyPr vertOverflow="overflow" horzOverflow="clip" vert="horz" wrap="square" lIns="91440" tIns="45720" rIns="91440" bIns="45720" numCol="1" spcCol="0" rtlCol="0" fromWordArt="0" anchor="t" anchorCtr="0" forceAA="0" compatLnSpc="0">
-            <a:normAutofit/>
-          </a:bodyPr>
-          <a:lstStyle>
-            <a:lvl1pPr marL="342900" indent="-342900" algn="l" defTabSz="457200">
-              <a:spcBef>
-                <a:spcPts val="999"/>
-              </a:spcBef>
-              <a:spcAft>
-                <a:spcPts val="0"/>
-              </a:spcAft>
-              <a:buClr>
-                <a:schemeClr val="accent1"/>
-              </a:buClr>
-              <a:buSzPct val="80000"/>
-              <a:buFont typeface="Wingdings 3"/>
-              <a:buChar char=""/>
-              <a:defRPr sz="1800">
-                <a:solidFill>
-                  <a:schemeClr val="tx1">
-                    <a:lumMod val="75000"/>
-                    <a:lumOff val="25000"/>
-                  </a:schemeClr>
-                </a:solidFill>
-                <a:latin typeface="+mn-lt"/>
-                <a:ea typeface="+mn-ea"/>
-                <a:cs typeface="+mn-cs"/>
-              </a:defRPr>
-            </a:lvl1pPr>
-            <a:lvl2pPr marL="742950" indent="-285750" algn="l" defTabSz="457200">
-              <a:spcBef>
-                <a:spcPts val="999"/>
-              </a:spcBef>
-              <a:spcAft>
-                <a:spcPts val="0"/>
-              </a:spcAft>
-              <a:buClr>
-                <a:schemeClr val="accent1"/>
-              </a:buClr>
-              <a:buSzPct val="80000"/>
-              <a:buFont typeface="Wingdings 3"/>
-              <a:buChar char=""/>
-              <a:defRPr sz="1600">
-                <a:solidFill>
-                  <a:schemeClr val="tx1">
-                    <a:lumMod val="75000"/>
-                    <a:lumOff val="25000"/>
-                  </a:schemeClr>
-                </a:solidFill>
-                <a:latin typeface="+mn-lt"/>
-                <a:ea typeface="+mn-ea"/>
-                <a:cs typeface="+mn-cs"/>
-              </a:defRPr>
-            </a:lvl2pPr>
-            <a:lvl3pPr marL="1143000" indent="-228600" algn="l" defTabSz="457200">
-              <a:spcBef>
-                <a:spcPts val="999"/>
-              </a:spcBef>
-              <a:spcAft>
-                <a:spcPts val="0"/>
-              </a:spcAft>
-              <a:buClr>
-                <a:schemeClr val="accent1"/>
-              </a:buClr>
-              <a:buSzPct val="80000"/>
-              <a:buFont typeface="Wingdings 3"/>
-              <a:buChar char=""/>
-              <a:defRPr sz="1400">
-                <a:solidFill>
-                  <a:schemeClr val="tx1">
-                    <a:lumMod val="75000"/>
-                    <a:lumOff val="25000"/>
-                  </a:schemeClr>
-                </a:solidFill>
-                <a:latin typeface="+mn-lt"/>
-                <a:ea typeface="+mn-ea"/>
-                <a:cs typeface="+mn-cs"/>
-              </a:defRPr>
-            </a:lvl3pPr>
-            <a:lvl4pPr marL="1600200" indent="-228600" algn="l" defTabSz="457200">
-              <a:spcBef>
-                <a:spcPts val="999"/>
-              </a:spcBef>
-              <a:spcAft>
-                <a:spcPts val="0"/>
-              </a:spcAft>
-              <a:buClr>
-                <a:schemeClr val="accent1"/>
-              </a:buClr>
-              <a:buSzPct val="80000"/>
-              <a:buFont typeface="Wingdings 3"/>
-              <a:buChar char=""/>
-              <a:defRPr sz="1200">
-                <a:solidFill>
-                  <a:schemeClr val="tx1">
-                    <a:lumMod val="75000"/>
-                    <a:lumOff val="25000"/>
-                  </a:schemeClr>
-                </a:solidFill>
-                <a:latin typeface="+mn-lt"/>
-                <a:ea typeface="+mn-ea"/>
-                <a:cs typeface="+mn-cs"/>
-              </a:defRPr>
-            </a:lvl4pPr>
-            <a:lvl5pPr marL="2057400" indent="-228600" algn="l" defTabSz="457200">
-              <a:spcBef>
-                <a:spcPts val="999"/>
-              </a:spcBef>
-              <a:spcAft>
-                <a:spcPts val="0"/>
-              </a:spcAft>
-              <a:buClr>
-                <a:schemeClr val="accent1"/>
-              </a:buClr>
-              <a:buSzPct val="80000"/>
-              <a:buFont typeface="Wingdings 3"/>
-              <a:buChar char=""/>
-              <a:defRPr sz="1200">
-                <a:solidFill>
-                  <a:schemeClr val="tx1">
-                    <a:lumMod val="75000"/>
-                    <a:lumOff val="25000"/>
-                  </a:schemeClr>
-                </a:solidFill>
-                <a:latin typeface="+mn-lt"/>
-                <a:ea typeface="+mn-ea"/>
-                <a:cs typeface="+mn-cs"/>
-              </a:defRPr>
-            </a:lvl5pPr>
-            <a:lvl6pPr marL="2514599" indent="-228600" algn="l" defTabSz="457200">
-              <a:spcBef>
-                <a:spcPts val="999"/>
-              </a:spcBef>
-              <a:spcAft>
-                <a:spcPts val="0"/>
-              </a:spcAft>
-              <a:buClr>
-                <a:schemeClr val="accent1"/>
-              </a:buClr>
-              <a:buSzPct val="80000"/>
-              <a:buFont typeface="Wingdings 3"/>
-              <a:buChar char=""/>
-              <a:defRPr sz="1200">
-                <a:solidFill>
-                  <a:schemeClr val="tx1">
-                    <a:lumMod val="75000"/>
-                    <a:lumOff val="25000"/>
-                  </a:schemeClr>
-                </a:solidFill>
-                <a:latin typeface="+mn-lt"/>
-                <a:ea typeface="+mn-ea"/>
-                <a:cs typeface="+mn-cs"/>
-              </a:defRPr>
-            </a:lvl6pPr>
-            <a:lvl7pPr marL="2971800" indent="-228600" algn="l" defTabSz="457200">
-              <a:spcBef>
-                <a:spcPts val="999"/>
-              </a:spcBef>
-              <a:spcAft>
-                <a:spcPts val="0"/>
-              </a:spcAft>
-              <a:buClr>
-                <a:schemeClr val="accent1"/>
-              </a:buClr>
-              <a:buSzPct val="80000"/>
-              <a:buFont typeface="Wingdings 3"/>
-              <a:buChar char=""/>
-              <a:defRPr sz="1200">
-                <a:solidFill>
-                  <a:schemeClr val="tx1">
-                    <a:lumMod val="75000"/>
-                    <a:lumOff val="25000"/>
-                  </a:schemeClr>
-                </a:solidFill>
-                <a:latin typeface="+mn-lt"/>
-                <a:ea typeface="+mn-ea"/>
-                <a:cs typeface="+mn-cs"/>
-              </a:defRPr>
-            </a:lvl7pPr>
-            <a:lvl8pPr marL="3429000" indent="-228600" algn="l" defTabSz="457200">
-              <a:spcBef>
-                <a:spcPts val="999"/>
-              </a:spcBef>
-              <a:spcAft>
-                <a:spcPts val="0"/>
-              </a:spcAft>
-              <a:buClr>
-                <a:schemeClr val="accent1"/>
-              </a:buClr>
-              <a:buSzPct val="80000"/>
-              <a:buFont typeface="Wingdings 3"/>
-              <a:buChar char=""/>
-              <a:defRPr sz="1200">
-                <a:solidFill>
-                  <a:schemeClr val="tx1">
-                    <a:lumMod val="75000"/>
-                    <a:lumOff val="25000"/>
-                  </a:schemeClr>
-                </a:solidFill>
-                <a:latin typeface="+mn-lt"/>
-                <a:ea typeface="+mn-ea"/>
-                <a:cs typeface="+mn-cs"/>
-              </a:defRPr>
-            </a:lvl8pPr>
-            <a:lvl9pPr marL="3886200" indent="-228600" algn="l" defTabSz="457200">
-              <a:spcBef>
-                <a:spcPts val="999"/>
-              </a:spcBef>
-              <a:spcAft>
-                <a:spcPts val="0"/>
-              </a:spcAft>
-              <a:buClr>
-                <a:schemeClr val="accent1"/>
-              </a:buClr>
-              <a:buSzPct val="80000"/>
-              <a:buFont typeface="Wingdings 3"/>
-              <a:buChar char=""/>
-              <a:defRPr sz="1200">
-                <a:solidFill>
-                  <a:schemeClr val="tx1">
-                    <a:lumMod val="75000"/>
-                    <a:lumOff val="25000"/>
-                  </a:schemeClr>
-                </a:solidFill>
-                <a:latin typeface="+mn-lt"/>
-                <a:ea typeface="+mn-ea"/>
-                <a:cs typeface="+mn-cs"/>
-              </a:defRPr>
-            </a:lvl9pPr>
-          </a:lstStyle>
-          <a:p>
-            <a:pPr>
-              <a:buClr>
-                <a:schemeClr val="accent1"/>
-              </a:buClr>
-              <a:buSzPct val="80000"/>
-              <a:buFont typeface="Wingdings"/>
-              <a:buChar char="Ø"/>
-              <a:defRPr/>
-            </a:pPr>
-            <a:r>
-              <a:rPr/>
-              <a:t>Vtable общая для всех объектов одного класса, т.е. дейсвует как статическая переменная-член данных</a:t>
-            </a:r>
-          </a:p>
-          <a:p>
-            <a:pPr>
-              <a:buClr>
-                <a:schemeClr val="accent1"/>
-              </a:buClr>
-              <a:buSzPct val="80000"/>
-              <a:buFont typeface="Wingdings"/>
-              <a:buChar char="Ø"/>
-              <a:defRPr/>
-            </a:pPr>
-            <a:r>
-              <a:rPr/>
-              <a:t>Vtable определяется в “самом базовом” классе и наследуется его производными классами</a:t>
-            </a:r>
-          </a:p>
-        </p:txBody>
-      </p:sp>
       <p:sp>
         <p:nvSpPr>
           <p:cNvPr id="172110094" name="Content Placeholder 2"/>
@@ -8297,9 +8612,461 @@
               <a:defRPr/>
             </a:pPr>
             <a:r>
-              <a:rPr/>
-              <a:t>На уровне компилятора полиморфизм реализуется при помощи таблицы виртуальных методов - vtable </a:t>
-            </a:r>
+              <a:rPr dirty="0" err="1"/>
+              <a:t>На</a:t>
+            </a:r>
+            <a:r>
+              <a:rPr dirty="0"/>
+              <a:t> </a:t>
+            </a:r>
+            <a:r>
+              <a:rPr dirty="0" err="1"/>
+              <a:t>уровне</a:t>
+            </a:r>
+            <a:r>
+              <a:rPr dirty="0"/>
+              <a:t> </a:t>
+            </a:r>
+            <a:r>
+              <a:rPr dirty="0" err="1"/>
+              <a:t>компилятора</a:t>
+            </a:r>
+            <a:r>
+              <a:rPr dirty="0"/>
+              <a:t> </a:t>
+            </a:r>
+            <a:r>
+              <a:rPr dirty="0" err="1"/>
+              <a:t>полиморфизм</a:t>
+            </a:r>
+            <a:r>
+              <a:rPr dirty="0"/>
+              <a:t> </a:t>
+            </a:r>
+            <a:r>
+              <a:rPr dirty="0" err="1"/>
+              <a:t>реализуется</a:t>
+            </a:r>
+            <a:r>
+              <a:rPr dirty="0"/>
+              <a:t> </a:t>
+            </a:r>
+            <a:r>
+              <a:rPr dirty="0" err="1"/>
+              <a:t>при</a:t>
+            </a:r>
+            <a:r>
+              <a:rPr dirty="0"/>
+              <a:t> </a:t>
+            </a:r>
+            <a:r>
+              <a:rPr dirty="0" err="1"/>
+              <a:t>помощи</a:t>
+            </a:r>
+            <a:r>
+              <a:rPr dirty="0"/>
+              <a:t> </a:t>
+            </a:r>
+            <a:r>
+              <a:rPr dirty="0" err="1"/>
+              <a:t>таблицы</a:t>
+            </a:r>
+            <a:r>
+              <a:rPr dirty="0"/>
+              <a:t> </a:t>
+            </a:r>
+            <a:r>
+              <a:rPr dirty="0" err="1"/>
+              <a:t>виртуальных</a:t>
+            </a:r>
+            <a:r>
+              <a:rPr dirty="0"/>
+              <a:t> </a:t>
+            </a:r>
+            <a:r>
+              <a:rPr dirty="0" err="1"/>
+              <a:t>методов</a:t>
+            </a:r>
+            <a:r>
+              <a:rPr dirty="0"/>
+              <a:t> - </a:t>
+            </a:r>
+            <a:r>
+              <a:rPr dirty="0" err="1"/>
+              <a:t>vtable</a:t>
+            </a:r>
+            <a:r>
+              <a:rPr dirty="0"/>
+              <a:t> </a:t>
+            </a:r>
+          </a:p>
+        </p:txBody>
+      </p:sp>
+      <p:sp>
+        <p:nvSpPr>
+          <p:cNvPr id="7" name="Content Placeholder 2"/>
+          <p:cNvSpPr>
+            <a:spLocks noGrp="1"/>
+          </p:cNvSpPr>
+          <p:nvPr/>
+        </p:nvSpPr>
+        <p:spPr bwMode="auto">
+          <a:xfrm>
+            <a:off x="536556" y="1725114"/>
+            <a:ext cx="11245538" cy="722999"/>
+          </a:xfrm>
+          <a:prstGeom prst="rect">
+            <a:avLst/>
+          </a:prstGeom>
+          <a:solidFill>
+            <a:schemeClr val="bg1"/>
+          </a:solidFill>
+        </p:spPr>
+        <p:txBody>
+          <a:bodyPr vertOverflow="overflow" horzOverflow="clip" vert="horz" wrap="square" lIns="91440" tIns="45720" rIns="91440" bIns="45720" numCol="1" spcCol="0" rtlCol="0" fromWordArt="0" anchor="t" anchorCtr="0" forceAA="0" compatLnSpc="0">
+            <a:normAutofit/>
+          </a:bodyPr>
+          <a:lstStyle>
+            <a:lvl1pPr marL="342900" indent="-342900" algn="l" defTabSz="457200">
+              <a:spcBef>
+                <a:spcPts val="999"/>
+              </a:spcBef>
+              <a:spcAft>
+                <a:spcPts val="0"/>
+              </a:spcAft>
+              <a:buClr>
+                <a:schemeClr val="accent1"/>
+              </a:buClr>
+              <a:buSzPct val="80000"/>
+              <a:buFont typeface="Wingdings 3"/>
+              <a:buChar char=""/>
+              <a:defRPr sz="1800">
+                <a:solidFill>
+                  <a:schemeClr val="tx1">
+                    <a:lumMod val="75000"/>
+                    <a:lumOff val="25000"/>
+                  </a:schemeClr>
+                </a:solidFill>
+                <a:latin typeface="+mn-lt"/>
+                <a:ea typeface="+mn-ea"/>
+                <a:cs typeface="+mn-cs"/>
+              </a:defRPr>
+            </a:lvl1pPr>
+            <a:lvl2pPr marL="742950" indent="-285750" algn="l" defTabSz="457200">
+              <a:spcBef>
+                <a:spcPts val="999"/>
+              </a:spcBef>
+              <a:spcAft>
+                <a:spcPts val="0"/>
+              </a:spcAft>
+              <a:buClr>
+                <a:schemeClr val="accent1"/>
+              </a:buClr>
+              <a:buSzPct val="80000"/>
+              <a:buFont typeface="Wingdings 3"/>
+              <a:buChar char=""/>
+              <a:defRPr sz="1600">
+                <a:solidFill>
+                  <a:schemeClr val="tx1">
+                    <a:lumMod val="75000"/>
+                    <a:lumOff val="25000"/>
+                  </a:schemeClr>
+                </a:solidFill>
+                <a:latin typeface="+mn-lt"/>
+                <a:ea typeface="+mn-ea"/>
+                <a:cs typeface="+mn-cs"/>
+              </a:defRPr>
+            </a:lvl2pPr>
+            <a:lvl3pPr marL="1143000" indent="-228600" algn="l" defTabSz="457200">
+              <a:spcBef>
+                <a:spcPts val="999"/>
+              </a:spcBef>
+              <a:spcAft>
+                <a:spcPts val="0"/>
+              </a:spcAft>
+              <a:buClr>
+                <a:schemeClr val="accent1"/>
+              </a:buClr>
+              <a:buSzPct val="80000"/>
+              <a:buFont typeface="Wingdings 3"/>
+              <a:buChar char=""/>
+              <a:defRPr sz="1400">
+                <a:solidFill>
+                  <a:schemeClr val="tx1">
+                    <a:lumMod val="75000"/>
+                    <a:lumOff val="25000"/>
+                  </a:schemeClr>
+                </a:solidFill>
+                <a:latin typeface="+mn-lt"/>
+                <a:ea typeface="+mn-ea"/>
+                <a:cs typeface="+mn-cs"/>
+              </a:defRPr>
+            </a:lvl3pPr>
+            <a:lvl4pPr marL="1600200" indent="-228600" algn="l" defTabSz="457200">
+              <a:spcBef>
+                <a:spcPts val="999"/>
+              </a:spcBef>
+              <a:spcAft>
+                <a:spcPts val="0"/>
+              </a:spcAft>
+              <a:buClr>
+                <a:schemeClr val="accent1"/>
+              </a:buClr>
+              <a:buSzPct val="80000"/>
+              <a:buFont typeface="Wingdings 3"/>
+              <a:buChar char=""/>
+              <a:defRPr sz="1200">
+                <a:solidFill>
+                  <a:schemeClr val="tx1">
+                    <a:lumMod val="75000"/>
+                    <a:lumOff val="25000"/>
+                  </a:schemeClr>
+                </a:solidFill>
+                <a:latin typeface="+mn-lt"/>
+                <a:ea typeface="+mn-ea"/>
+                <a:cs typeface="+mn-cs"/>
+              </a:defRPr>
+            </a:lvl4pPr>
+            <a:lvl5pPr marL="2057400" indent="-228600" algn="l" defTabSz="457200">
+              <a:spcBef>
+                <a:spcPts val="999"/>
+              </a:spcBef>
+              <a:spcAft>
+                <a:spcPts val="0"/>
+              </a:spcAft>
+              <a:buClr>
+                <a:schemeClr val="accent1"/>
+              </a:buClr>
+              <a:buSzPct val="80000"/>
+              <a:buFont typeface="Wingdings 3"/>
+              <a:buChar char=""/>
+              <a:defRPr sz="1200">
+                <a:solidFill>
+                  <a:schemeClr val="tx1">
+                    <a:lumMod val="75000"/>
+                    <a:lumOff val="25000"/>
+                  </a:schemeClr>
+                </a:solidFill>
+                <a:latin typeface="+mn-lt"/>
+                <a:ea typeface="+mn-ea"/>
+                <a:cs typeface="+mn-cs"/>
+              </a:defRPr>
+            </a:lvl5pPr>
+            <a:lvl6pPr marL="2514599" indent="-228600" algn="l" defTabSz="457200">
+              <a:spcBef>
+                <a:spcPts val="999"/>
+              </a:spcBef>
+              <a:spcAft>
+                <a:spcPts val="0"/>
+              </a:spcAft>
+              <a:buClr>
+                <a:schemeClr val="accent1"/>
+              </a:buClr>
+              <a:buSzPct val="80000"/>
+              <a:buFont typeface="Wingdings 3"/>
+              <a:buChar char=""/>
+              <a:defRPr sz="1200">
+                <a:solidFill>
+                  <a:schemeClr val="tx1">
+                    <a:lumMod val="75000"/>
+                    <a:lumOff val="25000"/>
+                  </a:schemeClr>
+                </a:solidFill>
+                <a:latin typeface="+mn-lt"/>
+                <a:ea typeface="+mn-ea"/>
+                <a:cs typeface="+mn-cs"/>
+              </a:defRPr>
+            </a:lvl6pPr>
+            <a:lvl7pPr marL="2971800" indent="-228600" algn="l" defTabSz="457200">
+              <a:spcBef>
+                <a:spcPts val="999"/>
+              </a:spcBef>
+              <a:spcAft>
+                <a:spcPts val="0"/>
+              </a:spcAft>
+              <a:buClr>
+                <a:schemeClr val="accent1"/>
+              </a:buClr>
+              <a:buSzPct val="80000"/>
+              <a:buFont typeface="Wingdings 3"/>
+              <a:buChar char=""/>
+              <a:defRPr sz="1200">
+                <a:solidFill>
+                  <a:schemeClr val="tx1">
+                    <a:lumMod val="75000"/>
+                    <a:lumOff val="25000"/>
+                  </a:schemeClr>
+                </a:solidFill>
+                <a:latin typeface="+mn-lt"/>
+                <a:ea typeface="+mn-ea"/>
+                <a:cs typeface="+mn-cs"/>
+              </a:defRPr>
+            </a:lvl7pPr>
+            <a:lvl8pPr marL="3429000" indent="-228600" algn="l" defTabSz="457200">
+              <a:spcBef>
+                <a:spcPts val="999"/>
+              </a:spcBef>
+              <a:spcAft>
+                <a:spcPts val="0"/>
+              </a:spcAft>
+              <a:buClr>
+                <a:schemeClr val="accent1"/>
+              </a:buClr>
+              <a:buSzPct val="80000"/>
+              <a:buFont typeface="Wingdings 3"/>
+              <a:buChar char=""/>
+              <a:defRPr sz="1200">
+                <a:solidFill>
+                  <a:schemeClr val="tx1">
+                    <a:lumMod val="75000"/>
+                    <a:lumOff val="25000"/>
+                  </a:schemeClr>
+                </a:solidFill>
+                <a:latin typeface="+mn-lt"/>
+                <a:ea typeface="+mn-ea"/>
+                <a:cs typeface="+mn-cs"/>
+              </a:defRPr>
+            </a:lvl8pPr>
+            <a:lvl9pPr marL="3886200" indent="-228600" algn="l" defTabSz="457200">
+              <a:spcBef>
+                <a:spcPts val="999"/>
+              </a:spcBef>
+              <a:spcAft>
+                <a:spcPts val="0"/>
+              </a:spcAft>
+              <a:buClr>
+                <a:schemeClr val="accent1"/>
+              </a:buClr>
+              <a:buSzPct val="80000"/>
+              <a:buFont typeface="Wingdings 3"/>
+              <a:buChar char=""/>
+              <a:defRPr sz="1200">
+                <a:solidFill>
+                  <a:schemeClr val="tx1">
+                    <a:lumMod val="75000"/>
+                    <a:lumOff val="25000"/>
+                  </a:schemeClr>
+                </a:solidFill>
+                <a:latin typeface="+mn-lt"/>
+                <a:ea typeface="+mn-ea"/>
+                <a:cs typeface="+mn-cs"/>
+              </a:defRPr>
+            </a:lvl9pPr>
+          </a:lstStyle>
+          <a:p>
+            <a:pPr>
+              <a:buClr>
+                <a:schemeClr val="accent1"/>
+              </a:buClr>
+              <a:buSzPct val="80000"/>
+              <a:buFont typeface="Wingdings"/>
+              <a:buChar char="Ø"/>
+              <a:defRPr/>
+            </a:pPr>
+            <a:r>
+              <a:rPr dirty="0" err="1"/>
+              <a:t>Компилируем</a:t>
+            </a:r>
+            <a:r>
+              <a:rPr dirty="0"/>
+              <a:t> </a:t>
+            </a:r>
+            <a:r>
+              <a:rPr dirty="0" err="1"/>
+              <a:t>программу</a:t>
+            </a:r>
+            <a:r>
+              <a:rPr dirty="0"/>
+              <a:t> </a:t>
+            </a:r>
+            <a:r>
+              <a:rPr dirty="0" err="1"/>
+              <a:t>для</a:t>
+            </a:r>
+            <a:r>
+              <a:rPr dirty="0"/>
+              <a:t> </a:t>
+            </a:r>
+            <a:r>
+              <a:rPr dirty="0" err="1"/>
+              <a:t>отладки</a:t>
+            </a:r>
+            <a:r>
+              <a:rPr dirty="0"/>
+              <a:t> и </a:t>
+            </a:r>
+            <a:r>
+              <a:rPr dirty="0" err="1"/>
+              <a:t>передаём</a:t>
+            </a:r>
+            <a:r>
+              <a:rPr dirty="0"/>
+              <a:t> </a:t>
+            </a:r>
+            <a:r>
+              <a:rPr dirty="0" err="1"/>
+              <a:t>бинарный</a:t>
+            </a:r>
+            <a:r>
+              <a:rPr dirty="0"/>
+              <a:t> </a:t>
+            </a:r>
+            <a:r>
+              <a:rPr dirty="0" err="1"/>
+              <a:t>файл</a:t>
+            </a:r>
+            <a:r>
+              <a:rPr dirty="0"/>
+              <a:t>  </a:t>
+            </a:r>
+            <a:r>
+              <a:rPr dirty="0" err="1"/>
+              <a:t>отладчику</a:t>
+            </a:r>
+            <a:r>
+              <a:rPr dirty="0"/>
+              <a:t>: </a:t>
+            </a:r>
+            <a:r>
+              <a:rPr dirty="0" err="1"/>
+              <a:t>например</a:t>
+            </a:r>
+            <a:r>
+              <a:rPr dirty="0"/>
+              <a:t>, </a:t>
+            </a:r>
+            <a:br>
+              <a:rPr dirty="0"/>
+            </a:br>
+            <a:r>
+              <a:rPr i="1" dirty="0"/>
+              <a:t>g++ –g main.cpp </a:t>
+            </a:r>
+            <a:r>
+              <a:rPr i="1" dirty="0">
+                <a:latin typeface="Andale Mono"/>
+                <a:ea typeface="Andale Mono"/>
+                <a:cs typeface="Andale Mono"/>
+              </a:rPr>
+              <a:t>&amp;&amp;</a:t>
+            </a:r>
+            <a:r>
+              <a:rPr i="1" dirty="0"/>
+              <a:t> </a:t>
+            </a:r>
+            <a:r>
+              <a:rPr i="1" dirty="0" err="1"/>
+              <a:t>gdb</a:t>
+            </a:r>
+            <a:r>
+              <a:rPr i="1" dirty="0"/>
+              <a:t> </a:t>
+            </a:r>
+            <a:r>
+              <a:rPr i="1" dirty="0" err="1"/>
+              <a:t>a.out</a:t>
+            </a:r>
+            <a:endParaRPr dirty="0"/>
           </a:p>
         </p:txBody>
       </p:sp>
@@ -8395,7 +9162,7 @@
         </p:blipFill>
         <p:spPr bwMode="auto">
           <a:xfrm>
-            <a:off x="611935" y="1891514"/>
+            <a:off x="611935" y="1484784"/>
             <a:ext cx="11104761" cy="719233"/>
           </a:xfrm>
           <a:prstGeom prst="rect">
@@ -8417,7 +9184,7 @@
         </p:blipFill>
         <p:spPr bwMode="auto">
           <a:xfrm>
-            <a:off x="631089" y="3457398"/>
+            <a:off x="631089" y="3050668"/>
             <a:ext cx="11104761" cy="2687108"/>
           </a:xfrm>
           <a:prstGeom prst="rect">
@@ -8435,7 +9202,7 @@
         </p:nvSpPr>
         <p:spPr bwMode="auto">
           <a:xfrm>
-            <a:off x="490312" y="2684737"/>
+            <a:off x="490312" y="2278007"/>
             <a:ext cx="11245538" cy="722999"/>
           </a:xfrm>
           <a:prstGeom prst="rect">
@@ -8703,7 +9470,7 @@
         </p:nvSpPr>
         <p:spPr bwMode="auto">
           <a:xfrm>
-            <a:off x="548628" y="6300348"/>
+            <a:off x="548628" y="5893618"/>
             <a:ext cx="11245538" cy="518894"/>
           </a:xfrm>
           <a:prstGeom prst="rect">
@@ -8958,294 +9725,6 @@
               <a:rPr/>
               <a:t>В vtable также записаны адреса в памяти - 64 b LE</a:t>
             </a:r>
-          </a:p>
-        </p:txBody>
-      </p:sp>
-      <p:sp>
-        <p:nvSpPr>
-          <p:cNvPr id="19177118" name="Content Placeholder 2"/>
-          <p:cNvSpPr>
-            <a:spLocks noGrp="1"/>
-          </p:cNvSpPr>
-          <p:nvPr/>
-        </p:nvSpPr>
-        <p:spPr bwMode="auto">
-          <a:xfrm>
-            <a:off x="536556" y="1115136"/>
-            <a:ext cx="11245538" cy="722999"/>
-          </a:xfrm>
-          <a:prstGeom prst="rect">
-            <a:avLst/>
-          </a:prstGeom>
-          <a:solidFill>
-            <a:schemeClr val="bg1"/>
-          </a:solidFill>
-        </p:spPr>
-        <p:txBody>
-          <a:bodyPr vertOverflow="overflow" horzOverflow="clip" vert="horz" wrap="square" lIns="91440" tIns="45720" rIns="91440" bIns="45720" numCol="1" spcCol="0" rtlCol="0" fromWordArt="0" anchor="t" anchorCtr="0" forceAA="0" compatLnSpc="0">
-            <a:normAutofit/>
-          </a:bodyPr>
-          <a:lstStyle>
-            <a:lvl1pPr marL="342900" indent="-342900" algn="l" defTabSz="457200">
-              <a:spcBef>
-                <a:spcPts val="999"/>
-              </a:spcBef>
-              <a:spcAft>
-                <a:spcPts val="0"/>
-              </a:spcAft>
-              <a:buClr>
-                <a:schemeClr val="accent1"/>
-              </a:buClr>
-              <a:buSzPct val="80000"/>
-              <a:buFont typeface="Wingdings 3"/>
-              <a:buChar char=""/>
-              <a:defRPr sz="1800">
-                <a:solidFill>
-                  <a:schemeClr val="tx1">
-                    <a:lumMod val="75000"/>
-                    <a:lumOff val="25000"/>
-                  </a:schemeClr>
-                </a:solidFill>
-                <a:latin typeface="+mn-lt"/>
-                <a:ea typeface="+mn-ea"/>
-                <a:cs typeface="+mn-cs"/>
-              </a:defRPr>
-            </a:lvl1pPr>
-            <a:lvl2pPr marL="742950" indent="-285750" algn="l" defTabSz="457200">
-              <a:spcBef>
-                <a:spcPts val="999"/>
-              </a:spcBef>
-              <a:spcAft>
-                <a:spcPts val="0"/>
-              </a:spcAft>
-              <a:buClr>
-                <a:schemeClr val="accent1"/>
-              </a:buClr>
-              <a:buSzPct val="80000"/>
-              <a:buFont typeface="Wingdings 3"/>
-              <a:buChar char=""/>
-              <a:defRPr sz="1600">
-                <a:solidFill>
-                  <a:schemeClr val="tx1">
-                    <a:lumMod val="75000"/>
-                    <a:lumOff val="25000"/>
-                  </a:schemeClr>
-                </a:solidFill>
-                <a:latin typeface="+mn-lt"/>
-                <a:ea typeface="+mn-ea"/>
-                <a:cs typeface="+mn-cs"/>
-              </a:defRPr>
-            </a:lvl2pPr>
-            <a:lvl3pPr marL="1143000" indent="-228600" algn="l" defTabSz="457200">
-              <a:spcBef>
-                <a:spcPts val="999"/>
-              </a:spcBef>
-              <a:spcAft>
-                <a:spcPts val="0"/>
-              </a:spcAft>
-              <a:buClr>
-                <a:schemeClr val="accent1"/>
-              </a:buClr>
-              <a:buSzPct val="80000"/>
-              <a:buFont typeface="Wingdings 3"/>
-              <a:buChar char=""/>
-              <a:defRPr sz="1400">
-                <a:solidFill>
-                  <a:schemeClr val="tx1">
-                    <a:lumMod val="75000"/>
-                    <a:lumOff val="25000"/>
-                  </a:schemeClr>
-                </a:solidFill>
-                <a:latin typeface="+mn-lt"/>
-                <a:ea typeface="+mn-ea"/>
-                <a:cs typeface="+mn-cs"/>
-              </a:defRPr>
-            </a:lvl3pPr>
-            <a:lvl4pPr marL="1600200" indent="-228600" algn="l" defTabSz="457200">
-              <a:spcBef>
-                <a:spcPts val="999"/>
-              </a:spcBef>
-              <a:spcAft>
-                <a:spcPts val="0"/>
-              </a:spcAft>
-              <a:buClr>
-                <a:schemeClr val="accent1"/>
-              </a:buClr>
-              <a:buSzPct val="80000"/>
-              <a:buFont typeface="Wingdings 3"/>
-              <a:buChar char=""/>
-              <a:defRPr sz="1200">
-                <a:solidFill>
-                  <a:schemeClr val="tx1">
-                    <a:lumMod val="75000"/>
-                    <a:lumOff val="25000"/>
-                  </a:schemeClr>
-                </a:solidFill>
-                <a:latin typeface="+mn-lt"/>
-                <a:ea typeface="+mn-ea"/>
-                <a:cs typeface="+mn-cs"/>
-              </a:defRPr>
-            </a:lvl4pPr>
-            <a:lvl5pPr marL="2057400" indent="-228600" algn="l" defTabSz="457200">
-              <a:spcBef>
-                <a:spcPts val="999"/>
-              </a:spcBef>
-              <a:spcAft>
-                <a:spcPts val="0"/>
-              </a:spcAft>
-              <a:buClr>
-                <a:schemeClr val="accent1"/>
-              </a:buClr>
-              <a:buSzPct val="80000"/>
-              <a:buFont typeface="Wingdings 3"/>
-              <a:buChar char=""/>
-              <a:defRPr sz="1200">
-                <a:solidFill>
-                  <a:schemeClr val="tx1">
-                    <a:lumMod val="75000"/>
-                    <a:lumOff val="25000"/>
-                  </a:schemeClr>
-                </a:solidFill>
-                <a:latin typeface="+mn-lt"/>
-                <a:ea typeface="+mn-ea"/>
-                <a:cs typeface="+mn-cs"/>
-              </a:defRPr>
-            </a:lvl5pPr>
-            <a:lvl6pPr marL="2514599" indent="-228600" algn="l" defTabSz="457200">
-              <a:spcBef>
-                <a:spcPts val="999"/>
-              </a:spcBef>
-              <a:spcAft>
-                <a:spcPts val="0"/>
-              </a:spcAft>
-              <a:buClr>
-                <a:schemeClr val="accent1"/>
-              </a:buClr>
-              <a:buSzPct val="80000"/>
-              <a:buFont typeface="Wingdings 3"/>
-              <a:buChar char=""/>
-              <a:defRPr sz="1200">
-                <a:solidFill>
-                  <a:schemeClr val="tx1">
-                    <a:lumMod val="75000"/>
-                    <a:lumOff val="25000"/>
-                  </a:schemeClr>
-                </a:solidFill>
-                <a:latin typeface="+mn-lt"/>
-                <a:ea typeface="+mn-ea"/>
-                <a:cs typeface="+mn-cs"/>
-              </a:defRPr>
-            </a:lvl6pPr>
-            <a:lvl7pPr marL="2971800" indent="-228600" algn="l" defTabSz="457200">
-              <a:spcBef>
-                <a:spcPts val="999"/>
-              </a:spcBef>
-              <a:spcAft>
-                <a:spcPts val="0"/>
-              </a:spcAft>
-              <a:buClr>
-                <a:schemeClr val="accent1"/>
-              </a:buClr>
-              <a:buSzPct val="80000"/>
-              <a:buFont typeface="Wingdings 3"/>
-              <a:buChar char=""/>
-              <a:defRPr sz="1200">
-                <a:solidFill>
-                  <a:schemeClr val="tx1">
-                    <a:lumMod val="75000"/>
-                    <a:lumOff val="25000"/>
-                  </a:schemeClr>
-                </a:solidFill>
-                <a:latin typeface="+mn-lt"/>
-                <a:ea typeface="+mn-ea"/>
-                <a:cs typeface="+mn-cs"/>
-              </a:defRPr>
-            </a:lvl7pPr>
-            <a:lvl8pPr marL="3429000" indent="-228600" algn="l" defTabSz="457200">
-              <a:spcBef>
-                <a:spcPts val="999"/>
-              </a:spcBef>
-              <a:spcAft>
-                <a:spcPts val="0"/>
-              </a:spcAft>
-              <a:buClr>
-                <a:schemeClr val="accent1"/>
-              </a:buClr>
-              <a:buSzPct val="80000"/>
-              <a:buFont typeface="Wingdings 3"/>
-              <a:buChar char=""/>
-              <a:defRPr sz="1200">
-                <a:solidFill>
-                  <a:schemeClr val="tx1">
-                    <a:lumMod val="75000"/>
-                    <a:lumOff val="25000"/>
-                  </a:schemeClr>
-                </a:solidFill>
-                <a:latin typeface="+mn-lt"/>
-                <a:ea typeface="+mn-ea"/>
-                <a:cs typeface="+mn-cs"/>
-              </a:defRPr>
-            </a:lvl8pPr>
-            <a:lvl9pPr marL="3886200" indent="-228600" algn="l" defTabSz="457200">
-              <a:spcBef>
-                <a:spcPts val="999"/>
-              </a:spcBef>
-              <a:spcAft>
-                <a:spcPts val="0"/>
-              </a:spcAft>
-              <a:buClr>
-                <a:schemeClr val="accent1"/>
-              </a:buClr>
-              <a:buSzPct val="80000"/>
-              <a:buFont typeface="Wingdings 3"/>
-              <a:buChar char=""/>
-              <a:defRPr sz="1200">
-                <a:solidFill>
-                  <a:schemeClr val="tx1">
-                    <a:lumMod val="75000"/>
-                    <a:lumOff val="25000"/>
-                  </a:schemeClr>
-                </a:solidFill>
-                <a:latin typeface="+mn-lt"/>
-                <a:ea typeface="+mn-ea"/>
-                <a:cs typeface="+mn-cs"/>
-              </a:defRPr>
-            </a:lvl9pPr>
-          </a:lstStyle>
-          <a:p>
-            <a:pPr>
-              <a:buClr>
-                <a:schemeClr val="accent1"/>
-              </a:buClr>
-              <a:buSzPct val="80000"/>
-              <a:buFont typeface="Wingdings"/>
-              <a:buChar char="Ø"/>
-              <a:defRPr/>
-            </a:pPr>
-            <a:r>
-              <a:rPr/>
-              <a:t>Компилируем программу для отладки и передаём бинарный файл  отладчику: например, </a:t>
-            </a:r>
-            <a:br>
-              <a:rPr/>
-            </a:br>
-            <a:r>
-              <a:rPr i="1"/>
-              <a:t>g++ –g main.cpp </a:t>
-            </a:r>
-            <a:r>
-              <a:rPr i="1">
-                <a:latin typeface="Andale Mono"/>
-                <a:ea typeface="Andale Mono"/>
-                <a:cs typeface="Andale Mono"/>
-              </a:rPr>
-              <a:t>&amp;&amp;</a:t>
-            </a:r>
-            <a:r>
-              <a:rPr i="1"/>
-              <a:t> gdb a.out</a:t>
-            </a:r>
-            <a:endParaRPr/>
           </a:p>
         </p:txBody>
       </p:sp>
@@ -12955,36 +13434,44 @@
               <a:defRPr/>
             </a:pPr>
             <a:r>
-              <a:rPr lang="ru-RU"/>
+              <a:rPr lang="ru-RU" dirty="0"/>
               <a:t>Проблемы начинаются, когда класс управляет памятью на куче: в этом случае указатель на выделенную объектом область памяти будет скопирован, а сама область памяти – нет</a:t>
             </a:r>
-            <a:endParaRPr/>
+            <a:endParaRPr dirty="0"/>
           </a:p>
           <a:p>
             <a:pPr>
               <a:defRPr/>
             </a:pPr>
             <a:r>
-              <a:rPr lang="ru-RU"/>
+              <a:rPr lang="ru-RU" dirty="0"/>
               <a:t>Два одинаковых указателя будут указывать на одну и ту же область памяти. Соответственно, в деструкторе одна и та же область памяти будет освобождена дважды. Ничего хорошего </a:t>
             </a:r>
-            <a:endParaRPr/>
+            <a:endParaRPr dirty="0"/>
           </a:p>
           <a:p>
             <a:pPr>
               <a:defRPr/>
             </a:pPr>
             <a:r>
-              <a:rPr lang="ru-RU"/>
-              <a:t>Решить проблему можно, определив конструктор копирования: специального метода класса, который вызывается при копировании объекта</a:t>
-            </a:r>
-            <a:endParaRPr/>
+              <a:rPr lang="ru-RU" dirty="0"/>
+              <a:t>Решить проблему можно, определив конструктор </a:t>
+            </a:r>
+            <a:r>
+              <a:rPr lang="ru-RU" dirty="0" smtClean="0"/>
+              <a:t>копирования - специальный </a:t>
+            </a:r>
+            <a:r>
+              <a:rPr lang="ru-RU" dirty="0"/>
+              <a:t>метода класса, который вызывается при копировании объекта</a:t>
+            </a:r>
+            <a:endParaRPr dirty="0"/>
           </a:p>
           <a:p>
             <a:pPr>
               <a:defRPr/>
             </a:pPr>
-            <a:endParaRPr lang="ru-RU"/>
+            <a:endParaRPr lang="ru-RU" dirty="0"/>
           </a:p>
           <a:p>
             <a:pPr marL="455613" indent="0">
@@ -12992,7 +13479,7 @@
               <a:buNone/>
               <a:defRPr/>
             </a:pPr>
-            <a:endParaRPr lang="ru-RU"/>
+            <a:endParaRPr lang="ru-RU" dirty="0"/>
           </a:p>
         </p:txBody>
       </p:sp>
@@ -13544,7 +14031,7 @@
               <a:defRPr/>
             </a:pPr>
             <a:r>
-              <a:rPr lang="ru-RU"/>
+              <a:rPr lang="ru-RU" dirty="0"/>
               <a:t>Конструкторы вызываются в порядке иерархии наследования классов, деструкторы - в обратном порядке </a:t>
             </a:r>
           </a:p>
@@ -13553,20 +14040,28 @@
               <a:defRPr/>
             </a:pPr>
             <a:r>
-              <a:rPr lang="ru-RU"/>
+              <a:rPr lang="ru-RU" dirty="0"/>
               <a:t>Поскольку базовый класс "ничего не знает" ни о каком производном классе, операции по инициализации, которые ему нужно выполнить, не зависят от операций инициализации, выполняемых производным классом, но, возможно, создают предварительные условия для последующей работы. Поэтому конструктор базового класса должен выполняться первым</a:t>
             </a:r>
-            <a:endParaRPr/>
+            <a:endParaRPr dirty="0"/>
           </a:p>
           <a:p>
             <a:pPr>
               <a:defRPr/>
             </a:pPr>
             <a:r>
-              <a:rPr lang="ru-RU"/>
-              <a:t>Поскольку базовый класс лежит в основе производного класса, разрушение базового класса подразумевает разрушение производного. Следовательно, деструктор производного класса имеет смысл вызвать до того, как объект будет полностью разрушен</a:t>
-            </a:r>
-            <a:endParaRPr lang="en-US"/>
+              <a:rPr lang="ru-RU" dirty="0"/>
+              <a:t>Поскольку базовый класс лежит в основе производного класса, разрушение </a:t>
+            </a:r>
+            <a:r>
+              <a:rPr lang="ru-RU" dirty="0" smtClean="0"/>
+              <a:t>объекта базового </a:t>
+            </a:r>
+            <a:r>
+              <a:rPr lang="ru-RU" dirty="0"/>
+              <a:t>класса подразумевает разрушение производного. Следовательно, деструктор производного класса имеет смысл вызвать до того, как объект будет полностью разрушен</a:t>
+            </a:r>
+            <a:endParaRPr lang="en-US" dirty="0"/>
           </a:p>
         </p:txBody>
       </p:sp>
@@ -16178,4 +16673,265 @@
   <a:objectDefaults/>
   <a:extraClrSchemeLst/>
 </a:theme>
+</file>
+
+<file path=ppt/theme/theme2.xml><?xml version="1.0" encoding="utf-8"?>
+<a:theme xmlns:a="http://schemas.openxmlformats.org/drawingml/2006/main" name="Тема Office">
+  <a:themeElements>
+    <a:clrScheme name="Стандартная">
+      <a:dk1>
+        <a:sysClr val="windowText" lastClr="000000"/>
+      </a:dk1>
+      <a:lt1>
+        <a:sysClr val="window" lastClr="FFFFFF"/>
+      </a:lt1>
+      <a:dk2>
+        <a:srgbClr val="44546A"/>
+      </a:dk2>
+      <a:lt2>
+        <a:srgbClr val="E7E6E6"/>
+      </a:lt2>
+      <a:accent1>
+        <a:srgbClr val="5B9BD5"/>
+      </a:accent1>
+      <a:accent2>
+        <a:srgbClr val="ED7D31"/>
+      </a:accent2>
+      <a:accent3>
+        <a:srgbClr val="A5A5A5"/>
+      </a:accent3>
+      <a:accent4>
+        <a:srgbClr val="FFC000"/>
+      </a:accent4>
+      <a:accent5>
+        <a:srgbClr val="4472C4"/>
+      </a:accent5>
+      <a:accent6>
+        <a:srgbClr val="70AD47"/>
+      </a:accent6>
+      <a:hlink>
+        <a:srgbClr val="0563C1"/>
+      </a:hlink>
+      <a:folHlink>
+        <a:srgbClr val="954F72"/>
+      </a:folHlink>
+    </a:clrScheme>
+    <a:fontScheme name="Стандартная">
+      <a:majorFont>
+        <a:latin typeface="Calibri Light" panose="020F0302020204030204"/>
+        <a:ea typeface=""/>
+        <a:cs typeface=""/>
+        <a:font script="Jpan" typeface="ＭＳ Ｐゴシック"/>
+        <a:font script="Hang" typeface="맑은 고딕"/>
+        <a:font script="Hans" typeface="宋体"/>
+        <a:font script="Hant" typeface="新細明體"/>
+        <a:font script="Arab" typeface="Times New Roman"/>
+        <a:font script="Hebr" typeface="Times New Roman"/>
+        <a:font script="Thai" typeface="Angsana New"/>
+        <a:font script="Ethi" typeface="Nyala"/>
+        <a:font script="Beng" typeface="Vrinda"/>
+        <a:font script="Gujr" typeface="Shruti"/>
+        <a:font script="Khmr" typeface="MoolBoran"/>
+        <a:font script="Knda" typeface="Tunga"/>
+        <a:font script="Guru" typeface="Raavi"/>
+        <a:font script="Cans" typeface="Euphemia"/>
+        <a:font script="Cher" typeface="Plantagenet Cherokee"/>
+        <a:font script="Yiii" typeface="Microsoft Yi Baiti"/>
+        <a:font script="Tibt" typeface="Microsoft Himalaya"/>
+        <a:font script="Thaa" typeface="MV Boli"/>
+        <a:font script="Deva" typeface="Mangal"/>
+        <a:font script="Telu" typeface="Gautami"/>
+        <a:font script="Taml" typeface="Latha"/>
+        <a:font script="Syrc" typeface="Estrangelo Edessa"/>
+        <a:font script="Orya" typeface="Kalinga"/>
+        <a:font script="Mlym" typeface="Kartika"/>
+        <a:font script="Laoo" typeface="DokChampa"/>
+        <a:font script="Sinh" typeface="Iskoola Pota"/>
+        <a:font script="Mong" typeface="Mongolian Baiti"/>
+        <a:font script="Viet" typeface="Times New Roman"/>
+        <a:font script="Uigh" typeface="Microsoft Uighur"/>
+        <a:font script="Geor" typeface="Sylfaen"/>
+      </a:majorFont>
+      <a:minorFont>
+        <a:latin typeface="Calibri" panose="020F0502020204030204"/>
+        <a:ea typeface=""/>
+        <a:cs typeface=""/>
+        <a:font script="Jpan" typeface="ＭＳ Ｐゴシック"/>
+        <a:font script="Hang" typeface="맑은 고딕"/>
+        <a:font script="Hans" typeface="宋体"/>
+        <a:font script="Hant" typeface="新細明體"/>
+        <a:font script="Arab" typeface="Arial"/>
+        <a:font script="Hebr" typeface="Arial"/>
+        <a:font script="Thai" typeface="Cordia New"/>
+        <a:font script="Ethi" typeface="Nyala"/>
+        <a:font script="Beng" typeface="Vrinda"/>
+        <a:font script="Gujr" typeface="Shruti"/>
+        <a:font script="Khmr" typeface="DaunPenh"/>
+        <a:font script="Knda" typeface="Tunga"/>
+        <a:font script="Guru" typeface="Raavi"/>
+        <a:font script="Cans" typeface="Euphemia"/>
+        <a:font script="Cher" typeface="Plantagenet Cherokee"/>
+        <a:font script="Yiii" typeface="Microsoft Yi Baiti"/>
+        <a:font script="Tibt" typeface="Microsoft Himalaya"/>
+        <a:font script="Thaa" typeface="MV Boli"/>
+        <a:font script="Deva" typeface="Mangal"/>
+        <a:font script="Telu" typeface="Gautami"/>
+        <a:font script="Taml" typeface="Latha"/>
+        <a:font script="Syrc" typeface="Estrangelo Edessa"/>
+        <a:font script="Orya" typeface="Kalinga"/>
+        <a:font script="Mlym" typeface="Kartika"/>
+        <a:font script="Laoo" typeface="DokChampa"/>
+        <a:font script="Sinh" typeface="Iskoola Pota"/>
+        <a:font script="Mong" typeface="Mongolian Baiti"/>
+        <a:font script="Viet" typeface="Arial"/>
+        <a:font script="Uigh" typeface="Microsoft Uighur"/>
+        <a:font script="Geor" typeface="Sylfaen"/>
+      </a:minorFont>
+    </a:fontScheme>
+    <a:fmtScheme name="Стандартная">
+      <a:fillStyleLst>
+        <a:solidFill>
+          <a:schemeClr val="phClr"/>
+        </a:solidFill>
+        <a:gradFill rotWithShape="1">
+          <a:gsLst>
+            <a:gs pos="0">
+              <a:schemeClr val="phClr">
+                <a:lumMod val="110000"/>
+                <a:satMod val="105000"/>
+                <a:tint val="67000"/>
+              </a:schemeClr>
+            </a:gs>
+            <a:gs pos="50000">
+              <a:schemeClr val="phClr">
+                <a:lumMod val="105000"/>
+                <a:satMod val="103000"/>
+                <a:tint val="73000"/>
+              </a:schemeClr>
+            </a:gs>
+            <a:gs pos="100000">
+              <a:schemeClr val="phClr">
+                <a:lumMod val="105000"/>
+                <a:satMod val="109000"/>
+                <a:tint val="81000"/>
+              </a:schemeClr>
+            </a:gs>
+          </a:gsLst>
+          <a:lin ang="5400000" scaled="0"/>
+        </a:gradFill>
+        <a:gradFill rotWithShape="1">
+          <a:gsLst>
+            <a:gs pos="0">
+              <a:schemeClr val="phClr">
+                <a:satMod val="103000"/>
+                <a:lumMod val="102000"/>
+                <a:tint val="94000"/>
+              </a:schemeClr>
+            </a:gs>
+            <a:gs pos="50000">
+              <a:schemeClr val="phClr">
+                <a:satMod val="110000"/>
+                <a:lumMod val="100000"/>
+                <a:shade val="100000"/>
+              </a:schemeClr>
+            </a:gs>
+            <a:gs pos="100000">
+              <a:schemeClr val="phClr">
+                <a:lumMod val="99000"/>
+                <a:satMod val="120000"/>
+                <a:shade val="78000"/>
+              </a:schemeClr>
+            </a:gs>
+          </a:gsLst>
+          <a:lin ang="5400000" scaled="0"/>
+        </a:gradFill>
+      </a:fillStyleLst>
+      <a:lnStyleLst>
+        <a:ln w="6350" cap="flat" cmpd="sng" algn="ctr">
+          <a:solidFill>
+            <a:schemeClr val="phClr"/>
+          </a:solidFill>
+          <a:prstDash val="solid"/>
+          <a:miter lim="800000"/>
+        </a:ln>
+        <a:ln w="12700" cap="flat" cmpd="sng" algn="ctr">
+          <a:solidFill>
+            <a:schemeClr val="phClr"/>
+          </a:solidFill>
+          <a:prstDash val="solid"/>
+          <a:miter lim="800000"/>
+        </a:ln>
+        <a:ln w="19050" cap="flat" cmpd="sng" algn="ctr">
+          <a:solidFill>
+            <a:schemeClr val="phClr"/>
+          </a:solidFill>
+          <a:prstDash val="solid"/>
+          <a:miter lim="800000"/>
+        </a:ln>
+      </a:lnStyleLst>
+      <a:effectStyleLst>
+        <a:effectStyle>
+          <a:effectLst/>
+        </a:effectStyle>
+        <a:effectStyle>
+          <a:effectLst/>
+        </a:effectStyle>
+        <a:effectStyle>
+          <a:effectLst>
+            <a:outerShdw blurRad="57150" dist="19050" dir="5400000" algn="ctr" rotWithShape="0">
+              <a:srgbClr val="000000">
+                <a:alpha val="63000"/>
+              </a:srgbClr>
+            </a:outerShdw>
+          </a:effectLst>
+        </a:effectStyle>
+      </a:effectStyleLst>
+      <a:bgFillStyleLst>
+        <a:solidFill>
+          <a:schemeClr val="phClr"/>
+        </a:solidFill>
+        <a:solidFill>
+          <a:schemeClr val="phClr">
+            <a:tint val="95000"/>
+            <a:satMod val="170000"/>
+          </a:schemeClr>
+        </a:solidFill>
+        <a:gradFill rotWithShape="1">
+          <a:gsLst>
+            <a:gs pos="0">
+              <a:schemeClr val="phClr">
+                <a:tint val="93000"/>
+                <a:satMod val="150000"/>
+                <a:shade val="98000"/>
+                <a:lumMod val="102000"/>
+              </a:schemeClr>
+            </a:gs>
+            <a:gs pos="50000">
+              <a:schemeClr val="phClr">
+                <a:tint val="98000"/>
+                <a:satMod val="130000"/>
+                <a:shade val="90000"/>
+                <a:lumMod val="103000"/>
+              </a:schemeClr>
+            </a:gs>
+            <a:gs pos="100000">
+              <a:schemeClr val="phClr">
+                <a:shade val="63000"/>
+                <a:satMod val="120000"/>
+              </a:schemeClr>
+            </a:gs>
+          </a:gsLst>
+          <a:lin ang="5400000" scaled="0"/>
+        </a:gradFill>
+      </a:bgFillStyleLst>
+    </a:fmtScheme>
+  </a:themeElements>
+  <a:objectDefaults/>
+  <a:extraClrSchemeLst/>
+  <a:extLst>
+    <a:ext uri="{05A4C25C-085E-4340-85A3-A5531E510DB2}">
+      <thm15:themeFamily xmlns:thm15="http://schemas.microsoft.com/office/thememl/2012/main" name="Office Theme" id="{62F939B6-93AF-4DB8-9C6B-D6C7DFDC589F}" vid="{4A3C46E8-61CC-4603-A589-7422A47A8E4A}"/>
+    </a:ext>
+  </a:extLst>
+</a:theme>
 </file>
</xml_diff>